<commit_message>
Update bonsai output ppt
</commit_message>
<xml_diff>
--- a/Documentation/2021-08-30-Bonsai output format.pptx
+++ b/Documentation/2021-08-30-Bonsai output format.pptx
@@ -5,14 +5,15 @@
     <p:sldMasterId id="2147483648" r:id="rId1"/>
   </p:sldMasterIdLst>
   <p:notesMasterIdLst>
-    <p:notesMasterId r:id="rId7"/>
+    <p:notesMasterId r:id="rId8"/>
   </p:notesMasterIdLst>
   <p:sldIdLst>
     <p:sldId id="256" r:id="rId2"/>
     <p:sldId id="258" r:id="rId3"/>
     <p:sldId id="259" r:id="rId4"/>
-    <p:sldId id="260" r:id="rId5"/>
-    <p:sldId id="257" r:id="rId6"/>
+    <p:sldId id="261" r:id="rId5"/>
+    <p:sldId id="260" r:id="rId6"/>
+    <p:sldId id="257" r:id="rId7"/>
   </p:sldIdLst>
   <p:sldSz cx="12192000" cy="6858000"/>
   <p:notesSz cx="6858000" cy="9144000"/>
@@ -111,6 +112,11 @@
       </a:defRPr>
     </a:lvl9pPr>
   </p:defaultTextStyle>
+  <p:extLst>
+    <p:ext uri="{EFAFB233-063F-42B5-8137-9DF3F51BA10A}">
+      <p15:sldGuideLst xmlns:p15="http://schemas.microsoft.com/office/powerpoint/2012/main"/>
+    </p:ext>
+  </p:extLst>
 </p:presentation>
 </file>
 
@@ -196,7 +202,7 @@
           <a:p>
             <a:fld id="{2F2AAA04-A364-C946-8638-47A95F5F82EA}" type="datetimeFigureOut">
               <a:rPr lang="en-US" smtClean="0"/>
-              <a:t>8/30/21</a:t>
+              <a:t>9/8/21</a:t>
             </a:fld>
             <a:endParaRPr lang="en-US"/>
           </a:p>
@@ -537,7 +543,7 @@
     </p:spTree>
     <p:extLst>
       <p:ext uri="{BB962C8B-B14F-4D97-AF65-F5344CB8AC3E}">
-        <p14:creationId xmlns:p14="http://schemas.microsoft.com/office/powerpoint/2010/main" val="620515448"/>
+        <p14:creationId xmlns:p14="http://schemas.microsoft.com/office/powerpoint/2010/main" val="3064020012"/>
       </p:ext>
     </p:extLst>
   </p:cSld>
@@ -613,6 +619,90 @@
             <a:fld id="{510844A4-8D85-AC4C-B1FE-275DF5DDB24C}" type="slidenum">
               <a:rPr lang="en-US" smtClean="0"/>
               <a:t>5</a:t>
+            </a:fld>
+            <a:endParaRPr lang="en-US"/>
+          </a:p>
+        </p:txBody>
+      </p:sp>
+    </p:spTree>
+    <p:extLst>
+      <p:ext uri="{BB962C8B-B14F-4D97-AF65-F5344CB8AC3E}">
+        <p14:creationId xmlns:p14="http://schemas.microsoft.com/office/powerpoint/2010/main" val="620515448"/>
+      </p:ext>
+    </p:extLst>
+  </p:cSld>
+  <p:clrMapOvr>
+    <a:masterClrMapping/>
+  </p:clrMapOvr>
+</p:notes>
+</file>
+
+<file path=ppt/notesSlides/notesSlide3.xml><?xml version="1.0" encoding="utf-8"?>
+<p:notes xmlns:a="http://schemas.openxmlformats.org/drawingml/2006/main" xmlns:r="http://schemas.openxmlformats.org/officeDocument/2006/relationships" xmlns:p="http://schemas.openxmlformats.org/presentationml/2006/main">
+  <p:cSld>
+    <p:spTree>
+      <p:nvGrpSpPr>
+        <p:cNvPr id="1" name=""/>
+        <p:cNvGrpSpPr/>
+        <p:nvPr/>
+      </p:nvGrpSpPr>
+      <p:grpSpPr>
+        <a:xfrm>
+          <a:off x="0" y="0"/>
+          <a:ext cx="0" cy="0"/>
+          <a:chOff x="0" y="0"/>
+          <a:chExt cx="0" cy="0"/>
+        </a:xfrm>
+      </p:grpSpPr>
+      <p:sp>
+        <p:nvSpPr>
+          <p:cNvPr id="2" name="Slide Image Placeholder 1"/>
+          <p:cNvSpPr>
+            <a:spLocks noGrp="1" noRot="1" noChangeAspect="1"/>
+          </p:cNvSpPr>
+          <p:nvPr>
+            <p:ph type="sldImg"/>
+          </p:nvPr>
+        </p:nvSpPr>
+        <p:spPr/>
+      </p:sp>
+      <p:sp>
+        <p:nvSpPr>
+          <p:cNvPr id="3" name="Notes Placeholder 2"/>
+          <p:cNvSpPr>
+            <a:spLocks noGrp="1"/>
+          </p:cNvSpPr>
+          <p:nvPr>
+            <p:ph type="body" idx="1"/>
+          </p:nvPr>
+        </p:nvSpPr>
+        <p:spPr/>
+        <p:txBody>
+          <a:bodyPr/>
+          <a:lstStyle/>
+          <a:p>
+            <a:endParaRPr lang="en-US" dirty="0"/>
+          </a:p>
+        </p:txBody>
+      </p:sp>
+      <p:sp>
+        <p:nvSpPr>
+          <p:cNvPr id="4" name="Slide Number Placeholder 3"/>
+          <p:cNvSpPr>
+            <a:spLocks noGrp="1"/>
+          </p:cNvSpPr>
+          <p:nvPr>
+            <p:ph type="sldNum" sz="quarter" idx="5"/>
+          </p:nvPr>
+        </p:nvSpPr>
+        <p:spPr/>
+        <p:txBody>
+          <a:bodyPr/>
+          <a:lstStyle/>
+          <a:p>
+            <a:fld id="{510844A4-8D85-AC4C-B1FE-275DF5DDB24C}" type="slidenum">
+              <a:rPr lang="en-US" smtClean="0"/>
+              <a:t>6</a:t>
             </a:fld>
             <a:endParaRPr lang="en-US"/>
           </a:p>
@@ -778,7 +868,7 @@
           <a:p>
             <a:fld id="{4408BC12-09AA-4B49-812E-3A34401B7AEE}" type="datetimeFigureOut">
               <a:rPr lang="en-US" smtClean="0"/>
-              <a:t>8/30/21</a:t>
+              <a:t>9/8/21</a:t>
             </a:fld>
             <a:endParaRPr lang="en-US"/>
           </a:p>
@@ -976,7 +1066,7 @@
           <a:p>
             <a:fld id="{4408BC12-09AA-4B49-812E-3A34401B7AEE}" type="datetimeFigureOut">
               <a:rPr lang="en-US" smtClean="0"/>
-              <a:t>8/30/21</a:t>
+              <a:t>9/8/21</a:t>
             </a:fld>
             <a:endParaRPr lang="en-US"/>
           </a:p>
@@ -1184,7 +1274,7 @@
           <a:p>
             <a:fld id="{4408BC12-09AA-4B49-812E-3A34401B7AEE}" type="datetimeFigureOut">
               <a:rPr lang="en-US" smtClean="0"/>
-              <a:t>8/30/21</a:t>
+              <a:t>9/8/21</a:t>
             </a:fld>
             <a:endParaRPr lang="en-US"/>
           </a:p>
@@ -1382,7 +1472,7 @@
           <a:p>
             <a:fld id="{4408BC12-09AA-4B49-812E-3A34401B7AEE}" type="datetimeFigureOut">
               <a:rPr lang="en-US" smtClean="0"/>
-              <a:t>8/30/21</a:t>
+              <a:t>9/8/21</a:t>
             </a:fld>
             <a:endParaRPr lang="en-US"/>
           </a:p>
@@ -1657,7 +1747,7 @@
           <a:p>
             <a:fld id="{4408BC12-09AA-4B49-812E-3A34401B7AEE}" type="datetimeFigureOut">
               <a:rPr lang="en-US" smtClean="0"/>
-              <a:t>8/30/21</a:t>
+              <a:t>9/8/21</a:t>
             </a:fld>
             <a:endParaRPr lang="en-US"/>
           </a:p>
@@ -1922,7 +2012,7 @@
           <a:p>
             <a:fld id="{4408BC12-09AA-4B49-812E-3A34401B7AEE}" type="datetimeFigureOut">
               <a:rPr lang="en-US" smtClean="0"/>
-              <a:t>8/30/21</a:t>
+              <a:t>9/8/21</a:t>
             </a:fld>
             <a:endParaRPr lang="en-US"/>
           </a:p>
@@ -2334,7 +2424,7 @@
           <a:p>
             <a:fld id="{4408BC12-09AA-4B49-812E-3A34401B7AEE}" type="datetimeFigureOut">
               <a:rPr lang="en-US" smtClean="0"/>
-              <a:t>8/30/21</a:t>
+              <a:t>9/8/21</a:t>
             </a:fld>
             <a:endParaRPr lang="en-US"/>
           </a:p>
@@ -2475,7 +2565,7 @@
           <a:p>
             <a:fld id="{4408BC12-09AA-4B49-812E-3A34401B7AEE}" type="datetimeFigureOut">
               <a:rPr lang="en-US" smtClean="0"/>
-              <a:t>8/30/21</a:t>
+              <a:t>9/8/21</a:t>
             </a:fld>
             <a:endParaRPr lang="en-US"/>
           </a:p>
@@ -2588,7 +2678,7 @@
           <a:p>
             <a:fld id="{4408BC12-09AA-4B49-812E-3A34401B7AEE}" type="datetimeFigureOut">
               <a:rPr lang="en-US" smtClean="0"/>
-              <a:t>8/30/21</a:t>
+              <a:t>9/8/21</a:t>
             </a:fld>
             <a:endParaRPr lang="en-US"/>
           </a:p>
@@ -2899,7 +2989,7 @@
           <a:p>
             <a:fld id="{4408BC12-09AA-4B49-812E-3A34401B7AEE}" type="datetimeFigureOut">
               <a:rPr lang="en-US" smtClean="0"/>
-              <a:t>8/30/21</a:t>
+              <a:t>9/8/21</a:t>
             </a:fld>
             <a:endParaRPr lang="en-US"/>
           </a:p>
@@ -3187,7 +3277,7 @@
           <a:p>
             <a:fld id="{4408BC12-09AA-4B49-812E-3A34401B7AEE}" type="datetimeFigureOut">
               <a:rPr lang="en-US" smtClean="0"/>
-              <a:t>8/30/21</a:t>
+              <a:t>9/8/21</a:t>
             </a:fld>
             <a:endParaRPr lang="en-US"/>
           </a:p>
@@ -3428,7 +3518,7 @@
           <a:p>
             <a:fld id="{4408BC12-09AA-4B49-812E-3A34401B7AEE}" type="datetimeFigureOut">
               <a:rPr lang="en-US" smtClean="0"/>
-              <a:t>8/30/21</a:t>
+              <a:t>9/8/21</a:t>
             </a:fld>
             <a:endParaRPr lang="en-US"/>
           </a:p>
@@ -4112,6 +4202,738 @@
 </file>
 
 <file path=ppt/slides/slide4.xml><?xml version="1.0" encoding="utf-8"?>
+<p:sld xmlns:a="http://schemas.openxmlformats.org/drawingml/2006/main" xmlns:r="http://schemas.openxmlformats.org/officeDocument/2006/relationships" xmlns:p="http://schemas.openxmlformats.org/presentationml/2006/main">
+  <p:cSld>
+    <p:spTree>
+      <p:nvGrpSpPr>
+        <p:cNvPr id="1" name=""/>
+        <p:cNvGrpSpPr/>
+        <p:nvPr/>
+      </p:nvGrpSpPr>
+      <p:grpSpPr>
+        <a:xfrm>
+          <a:off x="0" y="0"/>
+          <a:ext cx="0" cy="0"/>
+          <a:chOff x="0" y="0"/>
+          <a:chExt cx="0" cy="0"/>
+        </a:xfrm>
+      </p:grpSpPr>
+      <p:sp>
+        <p:nvSpPr>
+          <p:cNvPr id="2" name="Title 1">
+            <a:extLst>
+              <a:ext uri="{FF2B5EF4-FFF2-40B4-BE49-F238E27FC236}">
+                <a16:creationId xmlns:a16="http://schemas.microsoft.com/office/drawing/2014/main" id="{06E45EBF-35CE-864C-A324-5F37111EC124}"/>
+              </a:ext>
+            </a:extLst>
+          </p:cNvPr>
+          <p:cNvSpPr>
+            <a:spLocks noGrp="1"/>
+          </p:cNvSpPr>
+          <p:nvPr>
+            <p:ph type="title"/>
+          </p:nvPr>
+        </p:nvSpPr>
+        <p:spPr>
+          <a:xfrm>
+            <a:off x="167811" y="6572"/>
+            <a:ext cx="10515600" cy="1325563"/>
+          </a:xfrm>
+        </p:spPr>
+        <p:txBody>
+          <a:bodyPr/>
+          <a:lstStyle/>
+          <a:p>
+            <a:r>
+              <a:rPr lang="en-US" dirty="0"/>
+              <a:t>Dealing with behavioral clusters?</a:t>
+            </a:r>
+          </a:p>
+        </p:txBody>
+      </p:sp>
+      <p:sp>
+        <p:nvSpPr>
+          <p:cNvPr id="4" name="Rectangle 3">
+            <a:extLst>
+              <a:ext uri="{FF2B5EF4-FFF2-40B4-BE49-F238E27FC236}">
+                <a16:creationId xmlns:a16="http://schemas.microsoft.com/office/drawing/2014/main" id="{E74C850A-DFAD-724F-93D6-9908D24E8C42}"/>
+              </a:ext>
+            </a:extLst>
+          </p:cNvPr>
+          <p:cNvSpPr/>
+          <p:nvPr/>
+        </p:nvSpPr>
+        <p:spPr>
+          <a:xfrm>
+            <a:off x="641132" y="1199647"/>
+            <a:ext cx="2270234" cy="2250691"/>
+          </a:xfrm>
+          <a:prstGeom prst="rect">
+            <a:avLst/>
+          </a:prstGeom>
+        </p:spPr>
+        <p:style>
+          <a:lnRef idx="2">
+            <a:schemeClr val="accent1">
+              <a:shade val="50000"/>
+            </a:schemeClr>
+          </a:lnRef>
+          <a:fillRef idx="1">
+            <a:schemeClr val="accent1"/>
+          </a:fillRef>
+          <a:effectRef idx="0">
+            <a:schemeClr val="accent1"/>
+          </a:effectRef>
+          <a:fontRef idx="minor">
+            <a:schemeClr val="lt1"/>
+          </a:fontRef>
+        </p:style>
+        <p:txBody>
+          <a:bodyPr rtlCol="0" anchor="ctr"/>
+          <a:lstStyle/>
+          <a:p>
+            <a:pPr algn="ctr"/>
+            <a:r>
+              <a:rPr lang="en-US" dirty="0"/>
+              <a:t>BONSAI</a:t>
+            </a:r>
+          </a:p>
+        </p:txBody>
+      </p:sp>
+      <p:sp>
+        <p:nvSpPr>
+          <p:cNvPr id="5" name="Right Arrow 4">
+            <a:extLst>
+              <a:ext uri="{FF2B5EF4-FFF2-40B4-BE49-F238E27FC236}">
+                <a16:creationId xmlns:a16="http://schemas.microsoft.com/office/drawing/2014/main" id="{9BD8ED7C-1E48-854B-960A-3403413CEC28}"/>
+              </a:ext>
+            </a:extLst>
+          </p:cNvPr>
+          <p:cNvSpPr/>
+          <p:nvPr/>
+        </p:nvSpPr>
+        <p:spPr>
+          <a:xfrm>
+            <a:off x="3247697" y="2220628"/>
+            <a:ext cx="1240221" cy="273269"/>
+          </a:xfrm>
+          <a:prstGeom prst="rightArrow">
+            <a:avLst/>
+          </a:prstGeom>
+        </p:spPr>
+        <p:style>
+          <a:lnRef idx="2">
+            <a:schemeClr val="accent1">
+              <a:shade val="50000"/>
+            </a:schemeClr>
+          </a:lnRef>
+          <a:fillRef idx="1">
+            <a:schemeClr val="accent1"/>
+          </a:fillRef>
+          <a:effectRef idx="0">
+            <a:schemeClr val="accent1"/>
+          </a:effectRef>
+          <a:fontRef idx="minor">
+            <a:schemeClr val="lt1"/>
+          </a:fontRef>
+        </p:style>
+        <p:txBody>
+          <a:bodyPr rtlCol="0" anchor="ctr"/>
+          <a:lstStyle/>
+          <a:p>
+            <a:pPr algn="ctr"/>
+            <a:endParaRPr lang="en-US"/>
+          </a:p>
+        </p:txBody>
+      </p:sp>
+      <p:sp>
+        <p:nvSpPr>
+          <p:cNvPr id="6" name="TextBox 5">
+            <a:extLst>
+              <a:ext uri="{FF2B5EF4-FFF2-40B4-BE49-F238E27FC236}">
+                <a16:creationId xmlns:a16="http://schemas.microsoft.com/office/drawing/2014/main" id="{18B62898-8946-E646-B79B-602916912DAF}"/>
+              </a:ext>
+            </a:extLst>
+          </p:cNvPr>
+          <p:cNvSpPr txBox="1"/>
+          <p:nvPr/>
+        </p:nvSpPr>
+        <p:spPr>
+          <a:xfrm>
+            <a:off x="3560511" y="1851296"/>
+            <a:ext cx="614592" cy="369332"/>
+          </a:xfrm>
+          <a:prstGeom prst="rect">
+            <a:avLst/>
+          </a:prstGeom>
+          <a:noFill/>
+        </p:spPr>
+        <p:txBody>
+          <a:bodyPr wrap="none" rtlCol="0">
+            <a:spAutoFit/>
+          </a:bodyPr>
+          <a:lstStyle/>
+          <a:p>
+            <a:r>
+              <a:rPr lang="en-US" dirty="0"/>
+              <a:t>Save</a:t>
+            </a:r>
+          </a:p>
+        </p:txBody>
+      </p:sp>
+      <p:sp>
+        <p:nvSpPr>
+          <p:cNvPr id="7" name="Right Arrow 6">
+            <a:extLst>
+              <a:ext uri="{FF2B5EF4-FFF2-40B4-BE49-F238E27FC236}">
+                <a16:creationId xmlns:a16="http://schemas.microsoft.com/office/drawing/2014/main" id="{0A89359E-CF1B-E747-880A-F83C0259330B}"/>
+              </a:ext>
+            </a:extLst>
+          </p:cNvPr>
+          <p:cNvSpPr/>
+          <p:nvPr/>
+        </p:nvSpPr>
+        <p:spPr>
+          <a:xfrm rot="5400000">
+            <a:off x="1156138" y="4019156"/>
+            <a:ext cx="1240221" cy="273269"/>
+          </a:xfrm>
+          <a:prstGeom prst="rightArrow">
+            <a:avLst/>
+          </a:prstGeom>
+        </p:spPr>
+        <p:style>
+          <a:lnRef idx="2">
+            <a:schemeClr val="accent1">
+              <a:shade val="50000"/>
+            </a:schemeClr>
+          </a:lnRef>
+          <a:fillRef idx="1">
+            <a:schemeClr val="accent1"/>
+          </a:fillRef>
+          <a:effectRef idx="0">
+            <a:schemeClr val="accent1"/>
+          </a:effectRef>
+          <a:fontRef idx="minor">
+            <a:schemeClr val="lt1"/>
+          </a:fontRef>
+        </p:style>
+        <p:txBody>
+          <a:bodyPr rtlCol="0" anchor="ctr"/>
+          <a:lstStyle/>
+          <a:p>
+            <a:pPr algn="ctr"/>
+            <a:endParaRPr lang="en-US"/>
+          </a:p>
+        </p:txBody>
+      </p:sp>
+      <p:sp>
+        <p:nvSpPr>
+          <p:cNvPr id="8" name="TextBox 7">
+            <a:extLst>
+              <a:ext uri="{FF2B5EF4-FFF2-40B4-BE49-F238E27FC236}">
+                <a16:creationId xmlns:a16="http://schemas.microsoft.com/office/drawing/2014/main" id="{CECFAC71-2C47-6846-81BE-7D9A033F02B6}"/>
+              </a:ext>
+            </a:extLst>
+          </p:cNvPr>
+          <p:cNvSpPr txBox="1"/>
+          <p:nvPr/>
+        </p:nvSpPr>
+        <p:spPr>
+          <a:xfrm>
+            <a:off x="1912883" y="3885048"/>
+            <a:ext cx="1818896" cy="369332"/>
+          </a:xfrm>
+          <a:prstGeom prst="rect">
+            <a:avLst/>
+          </a:prstGeom>
+          <a:noFill/>
+        </p:spPr>
+        <p:txBody>
+          <a:bodyPr wrap="none" rtlCol="0">
+            <a:spAutoFit/>
+          </a:bodyPr>
+          <a:lstStyle/>
+          <a:p>
+            <a:r>
+              <a:rPr lang="en-US" dirty="0"/>
+              <a:t>Write digital lines</a:t>
+            </a:r>
+          </a:p>
+        </p:txBody>
+      </p:sp>
+      <p:sp>
+        <p:nvSpPr>
+          <p:cNvPr id="9" name="TextBox 8">
+            <a:extLst>
+              <a:ext uri="{FF2B5EF4-FFF2-40B4-BE49-F238E27FC236}">
+                <a16:creationId xmlns:a16="http://schemas.microsoft.com/office/drawing/2014/main" id="{9C92F1E0-A474-C740-A2A7-6CC3B7B51C22}"/>
+              </a:ext>
+            </a:extLst>
+          </p:cNvPr>
+          <p:cNvSpPr txBox="1"/>
+          <p:nvPr/>
+        </p:nvSpPr>
+        <p:spPr>
+          <a:xfrm>
+            <a:off x="1322245" y="4873756"/>
+            <a:ext cx="908005" cy="369332"/>
+          </a:xfrm>
+          <a:prstGeom prst="rect">
+            <a:avLst/>
+          </a:prstGeom>
+          <a:noFill/>
+        </p:spPr>
+        <p:txBody>
+          <a:bodyPr wrap="none" rtlCol="0">
+            <a:spAutoFit/>
+          </a:bodyPr>
+          <a:lstStyle/>
+          <a:p>
+            <a:r>
+              <a:rPr lang="en-US" dirty="0"/>
+              <a:t>Sync.h5</a:t>
+            </a:r>
+          </a:p>
+        </p:txBody>
+      </p:sp>
+      <p:sp>
+        <p:nvSpPr>
+          <p:cNvPr id="10" name="TextBox 9">
+            <a:extLst>
+              <a:ext uri="{FF2B5EF4-FFF2-40B4-BE49-F238E27FC236}">
+                <a16:creationId xmlns:a16="http://schemas.microsoft.com/office/drawing/2014/main" id="{05E0A55A-944E-D641-B47A-DEDBA40FD07E}"/>
+              </a:ext>
+            </a:extLst>
+          </p:cNvPr>
+          <p:cNvSpPr txBox="1"/>
+          <p:nvPr/>
+        </p:nvSpPr>
+        <p:spPr>
+          <a:xfrm>
+            <a:off x="4614042" y="1918878"/>
+            <a:ext cx="4647362" cy="369332"/>
+          </a:xfrm>
+          <a:prstGeom prst="rect">
+            <a:avLst/>
+          </a:prstGeom>
+          <a:noFill/>
+        </p:spPr>
+        <p:txBody>
+          <a:bodyPr wrap="none" rtlCol="0">
+            <a:spAutoFit/>
+          </a:bodyPr>
+          <a:lstStyle/>
+          <a:p>
+            <a:r>
+              <a:rPr lang="en-US" dirty="0" err="1"/>
+              <a:t>Meta.csv</a:t>
+            </a:r>
+            <a:r>
+              <a:rPr lang="en-US" dirty="0"/>
+              <a:t> : One CSV with meta-data parameters</a:t>
+            </a:r>
+          </a:p>
+        </p:txBody>
+      </p:sp>
+      <p:sp>
+        <p:nvSpPr>
+          <p:cNvPr id="11" name="TextBox 10">
+            <a:extLst>
+              <a:ext uri="{FF2B5EF4-FFF2-40B4-BE49-F238E27FC236}">
+                <a16:creationId xmlns:a16="http://schemas.microsoft.com/office/drawing/2014/main" id="{1C85FBA8-0ACB-3F45-9404-EEA5FC12AAF2}"/>
+              </a:ext>
+            </a:extLst>
+          </p:cNvPr>
+          <p:cNvSpPr txBox="1"/>
+          <p:nvPr/>
+        </p:nvSpPr>
+        <p:spPr>
+          <a:xfrm>
+            <a:off x="4632566" y="2357262"/>
+            <a:ext cx="5988499" cy="369332"/>
+          </a:xfrm>
+          <a:prstGeom prst="rect">
+            <a:avLst/>
+          </a:prstGeom>
+          <a:noFill/>
+        </p:spPr>
+        <p:txBody>
+          <a:bodyPr wrap="none" rtlCol="0">
+            <a:spAutoFit/>
+          </a:bodyPr>
+          <a:lstStyle/>
+          <a:p>
+            <a:r>
+              <a:rPr lang="en-US" dirty="0" err="1"/>
+              <a:t>Sync.csv</a:t>
+            </a:r>
+            <a:r>
+              <a:rPr lang="en-US" dirty="0"/>
+              <a:t> : One CSV with sync lines events with slow resolution</a:t>
+            </a:r>
+          </a:p>
+        </p:txBody>
+      </p:sp>
+      <p:sp>
+        <p:nvSpPr>
+          <p:cNvPr id="12" name="Right Arrow 11">
+            <a:extLst>
+              <a:ext uri="{FF2B5EF4-FFF2-40B4-BE49-F238E27FC236}">
+                <a16:creationId xmlns:a16="http://schemas.microsoft.com/office/drawing/2014/main" id="{F3046B6F-B267-DB4C-8DC5-52B06A486CBF}"/>
+              </a:ext>
+            </a:extLst>
+          </p:cNvPr>
+          <p:cNvSpPr/>
+          <p:nvPr/>
+        </p:nvSpPr>
+        <p:spPr>
+          <a:xfrm>
+            <a:off x="2732690" y="4917056"/>
+            <a:ext cx="1755228" cy="304800"/>
+          </a:xfrm>
+          <a:prstGeom prst="rightArrow">
+            <a:avLst/>
+          </a:prstGeom>
+        </p:spPr>
+        <p:style>
+          <a:lnRef idx="2">
+            <a:schemeClr val="accent1">
+              <a:shade val="50000"/>
+            </a:schemeClr>
+          </a:lnRef>
+          <a:fillRef idx="1">
+            <a:schemeClr val="accent1"/>
+          </a:fillRef>
+          <a:effectRef idx="0">
+            <a:schemeClr val="accent1"/>
+          </a:effectRef>
+          <a:fontRef idx="minor">
+            <a:schemeClr val="lt1"/>
+          </a:fontRef>
+        </p:style>
+        <p:txBody>
+          <a:bodyPr rtlCol="0" anchor="ctr"/>
+          <a:lstStyle/>
+          <a:p>
+            <a:pPr algn="ctr"/>
+            <a:endParaRPr lang="en-US"/>
+          </a:p>
+        </p:txBody>
+      </p:sp>
+      <p:sp>
+        <p:nvSpPr>
+          <p:cNvPr id="13" name="TextBox 12">
+            <a:extLst>
+              <a:ext uri="{FF2B5EF4-FFF2-40B4-BE49-F238E27FC236}">
+                <a16:creationId xmlns:a16="http://schemas.microsoft.com/office/drawing/2014/main" id="{A00FE03B-7365-2248-90D4-42C57DA7B6FA}"/>
+              </a:ext>
+            </a:extLst>
+          </p:cNvPr>
+          <p:cNvSpPr txBox="1"/>
+          <p:nvPr/>
+        </p:nvSpPr>
+        <p:spPr>
+          <a:xfrm>
+            <a:off x="2584067" y="4504424"/>
+            <a:ext cx="2027478" cy="369332"/>
+          </a:xfrm>
+          <a:prstGeom prst="rect">
+            <a:avLst/>
+          </a:prstGeom>
+          <a:noFill/>
+        </p:spPr>
+        <p:txBody>
+          <a:bodyPr wrap="none" rtlCol="0">
+            <a:spAutoFit/>
+          </a:bodyPr>
+          <a:lstStyle/>
+          <a:p>
+            <a:r>
+              <a:rPr lang="en-US" dirty="0"/>
+              <a:t>If Physio rig, upload</a:t>
+            </a:r>
+          </a:p>
+        </p:txBody>
+      </p:sp>
+      <p:sp>
+        <p:nvSpPr>
+          <p:cNvPr id="14" name="Right Arrow 13">
+            <a:extLst>
+              <a:ext uri="{FF2B5EF4-FFF2-40B4-BE49-F238E27FC236}">
+                <a16:creationId xmlns:a16="http://schemas.microsoft.com/office/drawing/2014/main" id="{21460B2D-29DC-E848-8552-BA5CF6794CCF}"/>
+              </a:ext>
+            </a:extLst>
+          </p:cNvPr>
+          <p:cNvSpPr/>
+          <p:nvPr/>
+        </p:nvSpPr>
+        <p:spPr>
+          <a:xfrm>
+            <a:off x="2732690" y="5697034"/>
+            <a:ext cx="1755228" cy="304800"/>
+          </a:xfrm>
+          <a:prstGeom prst="rightArrow">
+            <a:avLst/>
+          </a:prstGeom>
+        </p:spPr>
+        <p:style>
+          <a:lnRef idx="2">
+            <a:schemeClr val="accent1">
+              <a:shade val="50000"/>
+            </a:schemeClr>
+          </a:lnRef>
+          <a:fillRef idx="1">
+            <a:schemeClr val="accent1"/>
+          </a:fillRef>
+          <a:effectRef idx="0">
+            <a:schemeClr val="accent1"/>
+          </a:effectRef>
+          <a:fontRef idx="minor">
+            <a:schemeClr val="lt1"/>
+          </a:fontRef>
+        </p:style>
+        <p:txBody>
+          <a:bodyPr rtlCol="0" anchor="ctr"/>
+          <a:lstStyle/>
+          <a:p>
+            <a:pPr algn="ctr"/>
+            <a:endParaRPr lang="en-US"/>
+          </a:p>
+        </p:txBody>
+      </p:sp>
+      <p:sp>
+        <p:nvSpPr>
+          <p:cNvPr id="15" name="TextBox 14">
+            <a:extLst>
+              <a:ext uri="{FF2B5EF4-FFF2-40B4-BE49-F238E27FC236}">
+                <a16:creationId xmlns:a16="http://schemas.microsoft.com/office/drawing/2014/main" id="{1A670266-E287-B842-B2B7-074F01ACEA79}"/>
+              </a:ext>
+            </a:extLst>
+          </p:cNvPr>
+          <p:cNvSpPr txBox="1"/>
+          <p:nvPr/>
+        </p:nvSpPr>
+        <p:spPr>
+          <a:xfrm>
+            <a:off x="2732690" y="5340739"/>
+            <a:ext cx="1636987" cy="369332"/>
+          </a:xfrm>
+          <a:prstGeom prst="rect">
+            <a:avLst/>
+          </a:prstGeom>
+          <a:noFill/>
+        </p:spPr>
+        <p:txBody>
+          <a:bodyPr wrap="none" rtlCol="0">
+            <a:spAutoFit/>
+          </a:bodyPr>
+          <a:lstStyle/>
+          <a:p>
+            <a:r>
+              <a:rPr lang="en-US" dirty="0"/>
+              <a:t>If not Physio rig</a:t>
+            </a:r>
+          </a:p>
+        </p:txBody>
+      </p:sp>
+      <p:sp>
+        <p:nvSpPr>
+          <p:cNvPr id="16" name="Cross 15">
+            <a:extLst>
+              <a:ext uri="{FF2B5EF4-FFF2-40B4-BE49-F238E27FC236}">
+                <a16:creationId xmlns:a16="http://schemas.microsoft.com/office/drawing/2014/main" id="{7E8CAEFC-D949-D544-9CEB-DE887ED4E9D8}"/>
+              </a:ext>
+            </a:extLst>
+          </p:cNvPr>
+          <p:cNvSpPr/>
+          <p:nvPr/>
+        </p:nvSpPr>
+        <p:spPr>
+          <a:xfrm rot="18892124">
+            <a:off x="3178066" y="5519399"/>
+            <a:ext cx="746234" cy="831481"/>
+          </a:xfrm>
+          <a:prstGeom prst="plus">
+            <a:avLst>
+              <a:gd name="adj" fmla="val 50000"/>
+            </a:avLst>
+          </a:prstGeom>
+          <a:solidFill>
+            <a:srgbClr val="FF0000"/>
+          </a:solidFill>
+          <a:ln>
+            <a:solidFill>
+              <a:srgbClr val="FF0000"/>
+            </a:solidFill>
+          </a:ln>
+        </p:spPr>
+        <p:style>
+          <a:lnRef idx="2">
+            <a:schemeClr val="accent1">
+              <a:shade val="50000"/>
+            </a:schemeClr>
+          </a:lnRef>
+          <a:fillRef idx="1">
+            <a:schemeClr val="accent1"/>
+          </a:fillRef>
+          <a:effectRef idx="0">
+            <a:schemeClr val="accent1"/>
+          </a:effectRef>
+          <a:fontRef idx="minor">
+            <a:schemeClr val="lt1"/>
+          </a:fontRef>
+        </p:style>
+        <p:txBody>
+          <a:bodyPr rtlCol="0" anchor="ctr"/>
+          <a:lstStyle/>
+          <a:p>
+            <a:pPr algn="ctr"/>
+            <a:endParaRPr lang="en-US"/>
+          </a:p>
+        </p:txBody>
+      </p:sp>
+      <p:sp>
+        <p:nvSpPr>
+          <p:cNvPr id="17" name="TextBox 16">
+            <a:extLst>
+              <a:ext uri="{FF2B5EF4-FFF2-40B4-BE49-F238E27FC236}">
+                <a16:creationId xmlns:a16="http://schemas.microsoft.com/office/drawing/2014/main" id="{708B16FE-9641-E14A-B982-E8CD1CD17948}"/>
+              </a:ext>
+            </a:extLst>
+          </p:cNvPr>
+          <p:cNvSpPr txBox="1"/>
+          <p:nvPr/>
+        </p:nvSpPr>
+        <p:spPr>
+          <a:xfrm>
+            <a:off x="4740168" y="5707553"/>
+            <a:ext cx="3284104" cy="369332"/>
+          </a:xfrm>
+          <a:prstGeom prst="rect">
+            <a:avLst/>
+          </a:prstGeom>
+          <a:noFill/>
+        </p:spPr>
+        <p:txBody>
+          <a:bodyPr wrap="none" rtlCol="0">
+            <a:spAutoFit/>
+          </a:bodyPr>
+          <a:lstStyle/>
+          <a:p>
+            <a:r>
+              <a:rPr lang="en-US" dirty="0"/>
+              <a:t>Convert </a:t>
+            </a:r>
+            <a:r>
+              <a:rPr lang="en-US" dirty="0" err="1"/>
+              <a:t>Sync.csv</a:t>
+            </a:r>
+            <a:r>
+              <a:rPr lang="en-US" dirty="0"/>
+              <a:t> to Slow-Sync.h5</a:t>
+            </a:r>
+          </a:p>
+        </p:txBody>
+      </p:sp>
+      <p:sp>
+        <p:nvSpPr>
+          <p:cNvPr id="18" name="TextBox 17">
+            <a:extLst>
+              <a:ext uri="{FF2B5EF4-FFF2-40B4-BE49-F238E27FC236}">
+                <a16:creationId xmlns:a16="http://schemas.microsoft.com/office/drawing/2014/main" id="{4D4EB729-8191-B243-9EF7-05C52B1C8ACB}"/>
+              </a:ext>
+            </a:extLst>
+          </p:cNvPr>
+          <p:cNvSpPr txBox="1"/>
+          <p:nvPr/>
+        </p:nvSpPr>
+        <p:spPr>
+          <a:xfrm>
+            <a:off x="4752735" y="4873756"/>
+            <a:ext cx="1345753" cy="369332"/>
+          </a:xfrm>
+          <a:prstGeom prst="rect">
+            <a:avLst/>
+          </a:prstGeom>
+          <a:noFill/>
+        </p:spPr>
+        <p:txBody>
+          <a:bodyPr wrap="none" rtlCol="0">
+            <a:spAutoFit/>
+          </a:bodyPr>
+          <a:lstStyle/>
+          <a:p>
+            <a:r>
+              <a:rPr lang="en-US" dirty="0"/>
+              <a:t>Fast-Sync.h5</a:t>
+            </a:r>
+          </a:p>
+        </p:txBody>
+      </p:sp>
+      <p:sp>
+        <p:nvSpPr>
+          <p:cNvPr id="19" name="TextBox 18">
+            <a:extLst>
+              <a:ext uri="{FF2B5EF4-FFF2-40B4-BE49-F238E27FC236}">
+                <a16:creationId xmlns:a16="http://schemas.microsoft.com/office/drawing/2014/main" id="{8F93B563-88E1-AF46-8865-7C7C9BB47D53}"/>
+              </a:ext>
+            </a:extLst>
+          </p:cNvPr>
+          <p:cNvSpPr txBox="1"/>
+          <p:nvPr/>
+        </p:nvSpPr>
+        <p:spPr>
+          <a:xfrm>
+            <a:off x="8165462" y="5069456"/>
+            <a:ext cx="3800207" cy="646331"/>
+          </a:xfrm>
+          <a:prstGeom prst="rect">
+            <a:avLst/>
+          </a:prstGeom>
+          <a:noFill/>
+        </p:spPr>
+        <p:txBody>
+          <a:bodyPr wrap="none" rtlCol="0">
+            <a:spAutoFit/>
+          </a:bodyPr>
+          <a:lstStyle/>
+          <a:p>
+            <a:r>
+              <a:rPr lang="en-US" b="1" dirty="0"/>
+              <a:t>Downstream analysis </a:t>
+            </a:r>
+            <a:r>
+              <a:rPr lang="en-US" dirty="0"/>
+              <a:t>exclusively use</a:t>
+            </a:r>
+          </a:p>
+          <a:p>
+            <a:r>
+              <a:rPr lang="en-US" dirty="0" err="1"/>
+              <a:t>Meta.csv</a:t>
+            </a:r>
+            <a:r>
+              <a:rPr lang="en-US" dirty="0"/>
+              <a:t> and either Fast/Slow-Sync.h5</a:t>
+            </a:r>
+          </a:p>
+        </p:txBody>
+      </p:sp>
+    </p:spTree>
+    <p:extLst>
+      <p:ext uri="{BB962C8B-B14F-4D97-AF65-F5344CB8AC3E}">
+        <p14:creationId xmlns:p14="http://schemas.microsoft.com/office/powerpoint/2010/main" val="3718254059"/>
+      </p:ext>
+    </p:extLst>
+  </p:cSld>
+  <p:clrMapOvr>
+    <a:masterClrMapping/>
+  </p:clrMapOvr>
+</p:sld>
+</file>
+
+<file path=ppt/slides/slide5.xml><?xml version="1.0" encoding="utf-8"?>
 <p:sld xmlns:a="http://schemas.openxmlformats.org/drawingml/2006/main" xmlns:r="http://schemas.openxmlformats.org/officeDocument/2006/relationships" xmlns:p="http://schemas.openxmlformats.org/presentationml/2006/main">
   <p:cSld>
     <p:spTree>
@@ -5084,7 +5906,7 @@
 </p:sld>
 </file>
 
-<file path=ppt/slides/slide5.xml><?xml version="1.0" encoding="utf-8"?>
+<file path=ppt/slides/slide6.xml><?xml version="1.0" encoding="utf-8"?>
 <p:sld xmlns:a="http://schemas.openxmlformats.org/drawingml/2006/main" xmlns:r="http://schemas.openxmlformats.org/officeDocument/2006/relationships" xmlns:p="http://schemas.openxmlformats.org/presentationml/2006/main">
   <p:cSld>
     <p:spTree>

</xml_diff>